<commit_message>
Add extend existing html element
</commit_message>
<xml_diff>
--- a/Web-Components.pptx
+++ b/Web-Components.pptx
@@ -245,7 +245,7 @@
           <a:p>
             <a:fld id="{70FE56F2-0B60-44FC-AC55-491897A4F355}" type="datetimeFigureOut">
               <a:rPr lang="en-GB" smtClean="0"/>
-              <a:t>09/06/2020</a:t>
+              <a:t>10/06/2020</a:t>
             </a:fld>
             <a:endParaRPr lang="en-GB"/>
           </a:p>
@@ -662,7 +662,7 @@
           <a:p>
             <a:fld id="{4D723AB6-704A-42C8-AB51-31B091223600}" type="datetimeFigureOut">
               <a:rPr lang="en-GB" smtClean="0"/>
-              <a:t>09/06/2020</a:t>
+              <a:t>10/06/2020</a:t>
             </a:fld>
             <a:endParaRPr lang="en-GB"/>
           </a:p>
@@ -862,7 +862,7 @@
           <a:p>
             <a:fld id="{4D723AB6-704A-42C8-AB51-31B091223600}" type="datetimeFigureOut">
               <a:rPr lang="en-GB" smtClean="0"/>
-              <a:t>09/06/2020</a:t>
+              <a:t>10/06/2020</a:t>
             </a:fld>
             <a:endParaRPr lang="en-GB"/>
           </a:p>
@@ -1072,7 +1072,7 @@
           <a:p>
             <a:fld id="{4D723AB6-704A-42C8-AB51-31B091223600}" type="datetimeFigureOut">
               <a:rPr lang="en-GB" smtClean="0"/>
-              <a:t>09/06/2020</a:t>
+              <a:t>10/06/2020</a:t>
             </a:fld>
             <a:endParaRPr lang="en-GB"/>
           </a:p>
@@ -1272,7 +1272,7 @@
           <a:p>
             <a:fld id="{4D723AB6-704A-42C8-AB51-31B091223600}" type="datetimeFigureOut">
               <a:rPr lang="en-GB" smtClean="0"/>
-              <a:t>09/06/2020</a:t>
+              <a:t>10/06/2020</a:t>
             </a:fld>
             <a:endParaRPr lang="en-GB"/>
           </a:p>
@@ -1548,7 +1548,7 @@
           <a:p>
             <a:fld id="{4D723AB6-704A-42C8-AB51-31B091223600}" type="datetimeFigureOut">
               <a:rPr lang="en-GB" smtClean="0"/>
-              <a:t>09/06/2020</a:t>
+              <a:t>10/06/2020</a:t>
             </a:fld>
             <a:endParaRPr lang="en-GB"/>
           </a:p>
@@ -1816,7 +1816,7 @@
           <a:p>
             <a:fld id="{4D723AB6-704A-42C8-AB51-31B091223600}" type="datetimeFigureOut">
               <a:rPr lang="en-GB" smtClean="0"/>
-              <a:t>09/06/2020</a:t>
+              <a:t>10/06/2020</a:t>
             </a:fld>
             <a:endParaRPr lang="en-GB"/>
           </a:p>
@@ -2231,7 +2231,7 @@
           <a:p>
             <a:fld id="{4D723AB6-704A-42C8-AB51-31B091223600}" type="datetimeFigureOut">
               <a:rPr lang="en-GB" smtClean="0"/>
-              <a:t>09/06/2020</a:t>
+              <a:t>10/06/2020</a:t>
             </a:fld>
             <a:endParaRPr lang="en-GB"/>
           </a:p>
@@ -2373,7 +2373,7 @@
           <a:p>
             <a:fld id="{4D723AB6-704A-42C8-AB51-31B091223600}" type="datetimeFigureOut">
               <a:rPr lang="en-GB" smtClean="0"/>
-              <a:t>09/06/2020</a:t>
+              <a:t>10/06/2020</a:t>
             </a:fld>
             <a:endParaRPr lang="en-GB"/>
           </a:p>
@@ -2486,7 +2486,7 @@
           <a:p>
             <a:fld id="{4D723AB6-704A-42C8-AB51-31B091223600}" type="datetimeFigureOut">
               <a:rPr lang="en-GB" smtClean="0"/>
-              <a:t>09/06/2020</a:t>
+              <a:t>10/06/2020</a:t>
             </a:fld>
             <a:endParaRPr lang="en-GB"/>
           </a:p>
@@ -2799,7 +2799,7 @@
           <a:p>
             <a:fld id="{4D723AB6-704A-42C8-AB51-31B091223600}" type="datetimeFigureOut">
               <a:rPr lang="en-GB" smtClean="0"/>
-              <a:t>09/06/2020</a:t>
+              <a:t>10/06/2020</a:t>
             </a:fld>
             <a:endParaRPr lang="en-GB"/>
           </a:p>
@@ -3088,7 +3088,7 @@
           <a:p>
             <a:fld id="{4D723AB6-704A-42C8-AB51-31B091223600}" type="datetimeFigureOut">
               <a:rPr lang="en-GB" smtClean="0"/>
-              <a:t>09/06/2020</a:t>
+              <a:t>10/06/2020</a:t>
             </a:fld>
             <a:endParaRPr lang="en-GB"/>
           </a:p>
@@ -3331,7 +3331,7 @@
           <a:p>
             <a:fld id="{4D723AB6-704A-42C8-AB51-31B091223600}" type="datetimeFigureOut">
               <a:rPr lang="en-GB" smtClean="0"/>
-              <a:t>09/06/2020</a:t>
+              <a:t>10/06/2020</a:t>
             </a:fld>
             <a:endParaRPr lang="en-GB"/>
           </a:p>
@@ -4207,8 +4207,25 @@
                 <a:latin typeface="Segoe UI" panose="020B0502040204020203" pitchFamily="34" charset="0"/>
                 <a:cs typeface="Segoe UI" panose="020B0502040204020203" pitchFamily="34" charset="0"/>
               </a:rPr>
-              <a:t>We will look at a demo shortly…</a:t>
-            </a:r>
+              <a:t>We will look at </a:t>
+            </a:r>
+            <a:r>
+              <a:rPr lang="en-GB" sz="3600">
+                <a:solidFill>
+                  <a:srgbClr val="2196F3"/>
+                </a:solidFill>
+                <a:latin typeface="Segoe UI" panose="020B0502040204020203" pitchFamily="34" charset="0"/>
+                <a:cs typeface="Segoe UI" panose="020B0502040204020203" pitchFamily="34" charset="0"/>
+              </a:rPr>
+              <a:t>a demo…</a:t>
+            </a:r>
+            <a:endParaRPr lang="en-GB" sz="3600" dirty="0">
+              <a:solidFill>
+                <a:srgbClr val="2196F3"/>
+              </a:solidFill>
+              <a:latin typeface="Segoe UI" panose="020B0502040204020203" pitchFamily="34" charset="0"/>
+              <a:cs typeface="Segoe UI" panose="020B0502040204020203" pitchFamily="34" charset="0"/>
+            </a:endParaRPr>
           </a:p>
           <a:p>
             <a:pPr marL="457200" lvl="1" indent="0">
@@ -7317,7 +7334,7 @@
                 <a:latin typeface="Segoe UI" panose="020B0502040204020203" pitchFamily="34" charset="0"/>
                 <a:cs typeface="Segoe UI" panose="020B0502040204020203" pitchFamily="34" charset="0"/>
               </a:rPr>
-              <a:t>Prepare you to use all the workshop resources after the workshop.</a:t>
+              <a:t>Prepare you to use all the workshop resources after the workshop and links to other resources.</a:t>
             </a:r>
           </a:p>
           <a:p>

</xml_diff>